<commit_message>
Class 06 content added
</commit_message>
<xml_diff>
--- a/003CSS.pptx
+++ b/003CSS.pptx
@@ -1,6 +1,6 @@
 
 <file path=ppt/presentation.xml><?xml version="1.0" encoding="utf-8"?>
-<p:presentation xmlns:a="http://schemas.openxmlformats.org/drawingml/2006/main" xmlns:r="http://schemas.openxmlformats.org/officeDocument/2006/relationships" xmlns:p="http://schemas.openxmlformats.org/presentationml/2006/main" xmlns:m="http://schemas.openxmlformats.org/officeDocument/2006/math" xmlns:w="http://schemas.openxmlformats.org/wordprocessingml/2006/main" saveSubsetFonts="1">
+<p:presentation xmlns:a="http://schemas.openxmlformats.org/drawingml/2006/main" xmlns:r="http://schemas.openxmlformats.org/officeDocument/2006/relationships" xmlns:p="http://schemas.openxmlformats.org/presentationml/2006/main" saveSubsetFonts="1">
   <p:sldMasterIdLst>
     <p:sldMasterId id="2147483648" r:id="rId1"/>
   </p:sldMasterIdLst>
@@ -8,12 +8,14 @@
     <p:notesMasterId r:id="rId10"/>
   </p:notesMasterIdLst>
   <p:sldIdLst>
-    <p:sldId id="256" r:id="rId4"/>
-    <p:sldId id="257" r:id="rId5"/>
-    <p:sldId id="258" r:id="rId6"/>
-    <p:sldId id="259" r:id="rId7"/>
-    <p:sldId id="260" r:id="rId8"/>
-    <p:sldId id="261" r:id="rId9"/>
+    <p:sldId id="256" r:id="rId2"/>
+    <p:sldId id="257" r:id="rId3"/>
+    <p:sldId id="258" r:id="rId4"/>
+    <p:sldId id="259" r:id="rId5"/>
+    <p:sldId id="260" r:id="rId6"/>
+    <p:sldId id="261" r:id="rId7"/>
+    <p:sldId id="262" r:id="rId8"/>
+    <p:sldId id="263" r:id="rId9"/>
   </p:sldIdLst>
   <p:sldSz cx="12192000" cy="6858000"/>
   <p:notesSz cx="6858000" cy="9144000"/>
@@ -112,12 +114,28 @@
       </a:defRPr>
     </a:lvl9pPr>
   </p:defaultTextStyle>
+  <p:extLst>
+    <p:ext uri="{EFAFB233-063F-42B5-8137-9DF3F51BA10A}">
+      <p15:sldGuideLst xmlns:p15="http://schemas.microsoft.com/office/powerpoint/2012/main">
+        <p15:guide id="1" pos="3840">
+          <p15:clr>
+            <a:srgbClr val="A4A3A4"/>
+          </p15:clr>
+        </p15:guide>
+        <p15:guide id="2" orient="horz" pos="2160">
+          <p15:clr>
+            <a:srgbClr val="A4A3A4"/>
+          </p15:clr>
+        </p15:guide>
+      </p15:sldGuideLst>
+    </p:ext>
+  </p:extLst>
 </p:presentation>
 </file>
 
 <file path=ppt/notesMasters/notesMaster1.xml><?xml version="1.0" encoding="utf-8"?>
 <p:notesMaster xmlns:a="http://schemas.openxmlformats.org/drawingml/2006/main" xmlns:r="http://schemas.openxmlformats.org/officeDocument/2006/relationships" xmlns:p="http://schemas.openxmlformats.org/presentationml/2006/main">
-  <p:cSld name="">
+  <p:cSld>
     <p:bg>
       <p:bgRef idx="1001">
         <a:schemeClr val="bg1"/>
@@ -203,7 +221,7 @@
             </a:pPr>
             <a:fld id="{3632E96E-41F7-40C5-8419-297958CC00FA}" type="datetimeFigureOut">
               <a:rPr lang="en-US"/>
-              <a:t>10/30/2013</a:t>
+              <a:t>8/16/2024</a:t>
             </a:fld>
             <a:endParaRPr lang="en-US"/>
           </a:p>
@@ -213,7 +231,7 @@
         <p:nvSpPr>
           <p:cNvPr id="4" name="Slide Image Placeholder 3"/>
           <p:cNvSpPr>
-            <a:spLocks noChangeAspect="1" noGrp="1" noRot="1"/>
+            <a:spLocks noGrp="1" noRot="1" noChangeAspect="1"/>
           </p:cNvSpPr>
           <p:nvPr>
             <p:ph type="sldImg" idx="2"/>
@@ -315,7 +333,6 @@
               <a:rPr lang="en-US"/>
               <a:t>Fifth level</a:t>
             </a:r>
-            <a:endParaRPr lang="en-US"/>
           </a:p>
         </p:txBody>
       </p:sp>
@@ -490,8 +507,8 @@
 </file>
 
 <file path=ppt/notesSlides/notesSlide1.xml><?xml version="1.0" encoding="utf-8"?>
-<p:notes xmlns:a="http://schemas.openxmlformats.org/drawingml/2006/main" xmlns:r="http://schemas.openxmlformats.org/officeDocument/2006/relationships" xmlns:p="http://schemas.openxmlformats.org/presentationml/2006/main" xmlns:m="http://schemas.openxmlformats.org/officeDocument/2006/math" xmlns:w="http://schemas.openxmlformats.org/wordprocessingml/2006/main">
-  <p:cSld name="">
+<p:notes xmlns:a="http://schemas.openxmlformats.org/drawingml/2006/main" xmlns:r="http://schemas.openxmlformats.org/officeDocument/2006/relationships" xmlns:p="http://schemas.openxmlformats.org/presentationml/2006/main">
+  <p:cSld>
     <p:spTree>
       <p:nvGrpSpPr>
         <p:cNvPr id="1" name=""/>
@@ -510,7 +527,7 @@
         <p:nvSpPr>
           <p:cNvPr id="2" name="Slide Image Placeholder 1"/>
           <p:cNvSpPr>
-            <a:spLocks noChangeAspect="1" noGrp="1" noRot="1"/>
+            <a:spLocks noGrp="1" noRot="1" noChangeAspect="1"/>
           </p:cNvSpPr>
           <p:nvPr>
             <p:ph type="sldImg"/>
@@ -576,12 +593,15 @@
       </p:sp>
     </p:spTree>
   </p:cSld>
+  <p:clrMapOvr>
+    <a:masterClrMapping/>
+  </p:clrMapOvr>
 </p:notes>
 </file>
 
 <file path=ppt/notesSlides/notesSlide2.xml><?xml version="1.0" encoding="utf-8"?>
-<p:notes xmlns:a="http://schemas.openxmlformats.org/drawingml/2006/main" xmlns:r="http://schemas.openxmlformats.org/officeDocument/2006/relationships" xmlns:p="http://schemas.openxmlformats.org/presentationml/2006/main" xmlns:m="http://schemas.openxmlformats.org/officeDocument/2006/math" xmlns:w="http://schemas.openxmlformats.org/wordprocessingml/2006/main">
-  <p:cSld name="">
+<p:notes xmlns:a="http://schemas.openxmlformats.org/drawingml/2006/main" xmlns:r="http://schemas.openxmlformats.org/officeDocument/2006/relationships" xmlns:p="http://schemas.openxmlformats.org/presentationml/2006/main">
+  <p:cSld>
     <p:spTree>
       <p:nvGrpSpPr>
         <p:cNvPr id="1" name=""/>
@@ -600,7 +620,7 @@
         <p:nvSpPr>
           <p:cNvPr id="861795306" name="Slide Image Placeholder 1"/>
           <p:cNvSpPr>
-            <a:spLocks noChangeAspect="1" noGrp="1" noRot="1"/>
+            <a:spLocks noGrp="1" noRot="1" noChangeAspect="1"/>
           </p:cNvSpPr>
           <p:nvPr>
             <p:ph type="sldImg"/>
@@ -658,7 +678,7 @@
             </a:pPr>
             <a:fld id="{F935DDF1-B5F4-9D6A-5905-AFE7C47B117A}" type="slidenum">
               <a:rPr lang="en-US"/>
-              <a:t/>
+              <a:t>2</a:t>
             </a:fld>
             <a:endParaRPr lang="en-US"/>
           </a:p>
@@ -666,12 +686,15 @@
       </p:sp>
     </p:spTree>
   </p:cSld>
+  <p:clrMapOvr>
+    <a:masterClrMapping/>
+  </p:clrMapOvr>
 </p:notes>
 </file>
 
 <file path=ppt/notesSlides/notesSlide3.xml><?xml version="1.0" encoding="utf-8"?>
-<p:notes xmlns:a="http://schemas.openxmlformats.org/drawingml/2006/main" xmlns:r="http://schemas.openxmlformats.org/officeDocument/2006/relationships" xmlns:p="http://schemas.openxmlformats.org/presentationml/2006/main" xmlns:m="http://schemas.openxmlformats.org/officeDocument/2006/math" xmlns:w="http://schemas.openxmlformats.org/wordprocessingml/2006/main">
-  <p:cSld name="">
+<p:notes xmlns:a="http://schemas.openxmlformats.org/drawingml/2006/main" xmlns:r="http://schemas.openxmlformats.org/officeDocument/2006/relationships" xmlns:p="http://schemas.openxmlformats.org/presentationml/2006/main">
+  <p:cSld>
     <p:spTree>
       <p:nvGrpSpPr>
         <p:cNvPr id="1" name=""/>
@@ -690,7 +713,7 @@
         <p:nvSpPr>
           <p:cNvPr id="1736249084" name="Slide Image Placeholder 1"/>
           <p:cNvSpPr>
-            <a:spLocks noChangeAspect="1" noGrp="1" noRot="1"/>
+            <a:spLocks noGrp="1" noRot="1" noChangeAspect="1"/>
           </p:cNvSpPr>
           <p:nvPr>
             <p:ph type="sldImg"/>
@@ -748,7 +771,7 @@
             </a:pPr>
             <a:fld id="{10B218A8-6435-5754-F420-BA6283A37DD7}" type="slidenum">
               <a:rPr lang="en-US"/>
-              <a:t/>
+              <a:t>3</a:t>
             </a:fld>
             <a:endParaRPr lang="en-US"/>
           </a:p>
@@ -756,12 +779,15 @@
       </p:sp>
     </p:spTree>
   </p:cSld>
+  <p:clrMapOvr>
+    <a:masterClrMapping/>
+  </p:clrMapOvr>
 </p:notes>
 </file>
 
 <file path=ppt/notesSlides/notesSlide4.xml><?xml version="1.0" encoding="utf-8"?>
-<p:notes xmlns:a="http://schemas.openxmlformats.org/drawingml/2006/main" xmlns:r="http://schemas.openxmlformats.org/officeDocument/2006/relationships" xmlns:p="http://schemas.openxmlformats.org/presentationml/2006/main" xmlns:m="http://schemas.openxmlformats.org/officeDocument/2006/math" xmlns:w="http://schemas.openxmlformats.org/wordprocessingml/2006/main">
-  <p:cSld name="">
+<p:notes xmlns:a="http://schemas.openxmlformats.org/drawingml/2006/main" xmlns:r="http://schemas.openxmlformats.org/officeDocument/2006/relationships" xmlns:p="http://schemas.openxmlformats.org/presentationml/2006/main">
+  <p:cSld>
     <p:spTree>
       <p:nvGrpSpPr>
         <p:cNvPr id="1" name=""/>
@@ -780,7 +806,7 @@
         <p:nvSpPr>
           <p:cNvPr id="502013852" name="Slide Image Placeholder 1"/>
           <p:cNvSpPr>
-            <a:spLocks noChangeAspect="1" noGrp="1" noRot="1"/>
+            <a:spLocks noGrp="1" noRot="1" noChangeAspect="1"/>
           </p:cNvSpPr>
           <p:nvPr>
             <p:ph type="sldImg"/>
@@ -838,7 +864,7 @@
             </a:pPr>
             <a:fld id="{72611793-8BC8-B44B-DDEE-09B32DBBE2E1}" type="slidenum">
               <a:rPr lang="en-US"/>
-              <a:t/>
+              <a:t>4</a:t>
             </a:fld>
             <a:endParaRPr lang="en-US"/>
           </a:p>
@@ -846,12 +872,15 @@
       </p:sp>
     </p:spTree>
   </p:cSld>
+  <p:clrMapOvr>
+    <a:masterClrMapping/>
+  </p:clrMapOvr>
 </p:notes>
 </file>
 
 <file path=ppt/notesSlides/notesSlide5.xml><?xml version="1.0" encoding="utf-8"?>
-<p:notes xmlns:a="http://schemas.openxmlformats.org/drawingml/2006/main" xmlns:r="http://schemas.openxmlformats.org/officeDocument/2006/relationships" xmlns:p="http://schemas.openxmlformats.org/presentationml/2006/main" xmlns:m="http://schemas.openxmlformats.org/officeDocument/2006/math" xmlns:w="http://schemas.openxmlformats.org/wordprocessingml/2006/main">
-  <p:cSld name="">
+<p:notes xmlns:a="http://schemas.openxmlformats.org/drawingml/2006/main" xmlns:r="http://schemas.openxmlformats.org/officeDocument/2006/relationships" xmlns:p="http://schemas.openxmlformats.org/presentationml/2006/main">
+  <p:cSld>
     <p:spTree>
       <p:nvGrpSpPr>
         <p:cNvPr id="1" name=""/>
@@ -870,7 +899,7 @@
         <p:nvSpPr>
           <p:cNvPr id="1268959806" name="Slide Image Placeholder 1"/>
           <p:cNvSpPr>
-            <a:spLocks noChangeAspect="1" noGrp="1" noRot="1"/>
+            <a:spLocks noGrp="1" noRot="1" noChangeAspect="1"/>
           </p:cNvSpPr>
           <p:nvPr>
             <p:ph type="sldImg"/>
@@ -928,7 +957,7 @@
             </a:pPr>
             <a:fld id="{856AD6F7-4CF4-4A88-192C-3050E502463A}" type="slidenum">
               <a:rPr lang="en-US"/>
-              <a:t/>
+              <a:t>5</a:t>
             </a:fld>
             <a:endParaRPr lang="en-US"/>
           </a:p>
@@ -936,12 +965,15 @@
       </p:sp>
     </p:spTree>
   </p:cSld>
+  <p:clrMapOvr>
+    <a:masterClrMapping/>
+  </p:clrMapOvr>
 </p:notes>
 </file>
 
 <file path=ppt/notesSlides/notesSlide6.xml><?xml version="1.0" encoding="utf-8"?>
-<p:notes xmlns:a="http://schemas.openxmlformats.org/drawingml/2006/main" xmlns:r="http://schemas.openxmlformats.org/officeDocument/2006/relationships" xmlns:p="http://schemas.openxmlformats.org/presentationml/2006/main" xmlns:m="http://schemas.openxmlformats.org/officeDocument/2006/math" xmlns:w="http://schemas.openxmlformats.org/wordprocessingml/2006/main">
-  <p:cSld name="">
+<p:notes xmlns:a="http://schemas.openxmlformats.org/drawingml/2006/main" xmlns:r="http://schemas.openxmlformats.org/officeDocument/2006/relationships" xmlns:p="http://schemas.openxmlformats.org/presentationml/2006/main">
+  <p:cSld>
     <p:spTree>
       <p:nvGrpSpPr>
         <p:cNvPr id="1" name=""/>
@@ -960,7 +992,7 @@
         <p:nvSpPr>
           <p:cNvPr id="2086049207" name="Slide Image Placeholder 1"/>
           <p:cNvSpPr>
-            <a:spLocks noChangeAspect="1" noGrp="1" noRot="1"/>
+            <a:spLocks noGrp="1" noRot="1" noChangeAspect="1"/>
           </p:cNvSpPr>
           <p:nvPr>
             <p:ph type="sldImg"/>
@@ -1018,7 +1050,7 @@
             </a:pPr>
             <a:fld id="{F6B8FCC0-A58A-87B5-D2B8-DDFB235E8565}" type="slidenum">
               <a:rPr lang="en-US"/>
-              <a:t/>
+              <a:t>6</a:t>
             </a:fld>
             <a:endParaRPr lang="en-US"/>
           </a:p>
@@ -1026,11 +1058,210 @@
       </p:sp>
     </p:spTree>
   </p:cSld>
+  <p:clrMapOvr>
+    <a:masterClrMapping/>
+  </p:clrMapOvr>
+</p:notes>
+</file>
+
+<file path=ppt/notesSlides/notesSlide7.xml><?xml version="1.0" encoding="utf-8"?>
+<p:notes xmlns:a="http://schemas.openxmlformats.org/drawingml/2006/main" xmlns:r="http://schemas.openxmlformats.org/officeDocument/2006/relationships" xmlns:p="http://schemas.openxmlformats.org/presentationml/2006/main">
+  <p:cSld>
+    <p:spTree>
+      <p:nvGrpSpPr>
+        <p:cNvPr id="1" name=""/>
+        <p:cNvGrpSpPr/>
+        <p:nvPr/>
+      </p:nvGrpSpPr>
+      <p:grpSpPr bwMode="auto">
+        <a:xfrm>
+          <a:off x="0" y="0"/>
+          <a:ext cx="0" cy="0"/>
+          <a:chOff x="0" y="0"/>
+          <a:chExt cx="0" cy="0"/>
+        </a:xfrm>
+      </p:grpSpPr>
+      <p:sp>
+        <p:nvSpPr>
+          <p:cNvPr id="2086049207" name="Slide Image Placeholder 1"/>
+          <p:cNvSpPr>
+            <a:spLocks noGrp="1" noRot="1" noChangeAspect="1"/>
+          </p:cNvSpPr>
+          <p:nvPr>
+            <p:ph type="sldImg"/>
+          </p:nvPr>
+        </p:nvSpPr>
+        <p:spPr bwMode="auto">
+          <a:xfrm>
+            <a:off x="685800" y="1143000"/>
+            <a:ext cx="5486400" cy="3086100"/>
+          </a:xfrm>
+        </p:spPr>
+      </p:sp>
+      <p:sp>
+        <p:nvSpPr>
+          <p:cNvPr id="541095633" name="Notes Placeholder 2"/>
+          <p:cNvSpPr>
+            <a:spLocks noGrp="1"/>
+          </p:cNvSpPr>
+          <p:nvPr>
+            <p:ph type="body" idx="1"/>
+          </p:nvPr>
+        </p:nvSpPr>
+        <p:spPr bwMode="auto"/>
+        <p:txBody>
+          <a:bodyPr/>
+          <a:lstStyle/>
+          <a:p>
+            <a:pPr>
+              <a:defRPr/>
+            </a:pPr>
+            <a:endParaRPr lang="en-US">
+              <a:latin typeface="Arial"/>
+              <a:cs typeface="Arial"/>
+            </a:endParaRPr>
+          </a:p>
+        </p:txBody>
+      </p:sp>
+      <p:sp>
+        <p:nvSpPr>
+          <p:cNvPr id="2132063061" name="Slide Number Placeholder 3"/>
+          <p:cNvSpPr>
+            <a:spLocks noGrp="1"/>
+          </p:cNvSpPr>
+          <p:nvPr>
+            <p:ph type="sldNum" sz="quarter" idx="10"/>
+          </p:nvPr>
+        </p:nvSpPr>
+        <p:spPr bwMode="auto"/>
+        <p:txBody>
+          <a:bodyPr/>
+          <a:lstStyle/>
+          <a:p>
+            <a:pPr>
+              <a:defRPr/>
+            </a:pPr>
+            <a:fld id="{F6B8FCC0-A58A-87B5-D2B8-DDFB235E8565}" type="slidenum">
+              <a:rPr lang="en-US"/>
+              <a:t>7</a:t>
+            </a:fld>
+            <a:endParaRPr lang="en-US"/>
+          </a:p>
+        </p:txBody>
+      </p:sp>
+    </p:spTree>
+    <p:extLst>
+      <p:ext uri="{BB962C8B-B14F-4D97-AF65-F5344CB8AC3E}">
+        <p14:creationId xmlns:p14="http://schemas.microsoft.com/office/powerpoint/2010/main" val="3417138343"/>
+      </p:ext>
+    </p:extLst>
+  </p:cSld>
+  <p:clrMapOvr>
+    <a:masterClrMapping/>
+  </p:clrMapOvr>
+</p:notes>
+</file>
+
+<file path=ppt/notesSlides/notesSlide8.xml><?xml version="1.0" encoding="utf-8"?>
+<p:notes xmlns:a="http://schemas.openxmlformats.org/drawingml/2006/main" xmlns:r="http://schemas.openxmlformats.org/officeDocument/2006/relationships" xmlns:p="http://schemas.openxmlformats.org/presentationml/2006/main">
+  <p:cSld>
+    <p:spTree>
+      <p:nvGrpSpPr>
+        <p:cNvPr id="1" name=""/>
+        <p:cNvGrpSpPr/>
+        <p:nvPr/>
+      </p:nvGrpSpPr>
+      <p:grpSpPr bwMode="auto">
+        <a:xfrm>
+          <a:off x="0" y="0"/>
+          <a:ext cx="0" cy="0"/>
+          <a:chOff x="0" y="0"/>
+          <a:chExt cx="0" cy="0"/>
+        </a:xfrm>
+      </p:grpSpPr>
+      <p:sp>
+        <p:nvSpPr>
+          <p:cNvPr id="2086049207" name="Slide Image Placeholder 1"/>
+          <p:cNvSpPr>
+            <a:spLocks noGrp="1" noRot="1" noChangeAspect="1"/>
+          </p:cNvSpPr>
+          <p:nvPr>
+            <p:ph type="sldImg"/>
+          </p:nvPr>
+        </p:nvSpPr>
+        <p:spPr bwMode="auto">
+          <a:xfrm>
+            <a:off x="685800" y="1143000"/>
+            <a:ext cx="5486400" cy="3086100"/>
+          </a:xfrm>
+        </p:spPr>
+      </p:sp>
+      <p:sp>
+        <p:nvSpPr>
+          <p:cNvPr id="541095633" name="Notes Placeholder 2"/>
+          <p:cNvSpPr>
+            <a:spLocks noGrp="1"/>
+          </p:cNvSpPr>
+          <p:nvPr>
+            <p:ph type="body" idx="1"/>
+          </p:nvPr>
+        </p:nvSpPr>
+        <p:spPr bwMode="auto"/>
+        <p:txBody>
+          <a:bodyPr/>
+          <a:lstStyle/>
+          <a:p>
+            <a:pPr>
+              <a:defRPr/>
+            </a:pPr>
+            <a:endParaRPr lang="en-US">
+              <a:latin typeface="Arial"/>
+              <a:cs typeface="Arial"/>
+            </a:endParaRPr>
+          </a:p>
+        </p:txBody>
+      </p:sp>
+      <p:sp>
+        <p:nvSpPr>
+          <p:cNvPr id="2132063061" name="Slide Number Placeholder 3"/>
+          <p:cNvSpPr>
+            <a:spLocks noGrp="1"/>
+          </p:cNvSpPr>
+          <p:nvPr>
+            <p:ph type="sldNum" sz="quarter" idx="10"/>
+          </p:nvPr>
+        </p:nvSpPr>
+        <p:spPr bwMode="auto"/>
+        <p:txBody>
+          <a:bodyPr/>
+          <a:lstStyle/>
+          <a:p>
+            <a:pPr>
+              <a:defRPr/>
+            </a:pPr>
+            <a:fld id="{F6B8FCC0-A58A-87B5-D2B8-DDFB235E8565}" type="slidenum">
+              <a:rPr lang="en-US"/>
+              <a:t>8</a:t>
+            </a:fld>
+            <a:endParaRPr lang="en-US"/>
+          </a:p>
+        </p:txBody>
+      </p:sp>
+    </p:spTree>
+    <p:extLst>
+      <p:ext uri="{BB962C8B-B14F-4D97-AF65-F5344CB8AC3E}">
+        <p14:creationId xmlns:p14="http://schemas.microsoft.com/office/powerpoint/2010/main" val="1283159779"/>
+      </p:ext>
+    </p:extLst>
+  </p:cSld>
+  <p:clrMapOvr>
+    <a:masterClrMapping/>
+  </p:clrMapOvr>
 </p:notes>
 </file>
 
 <file path=ppt/slideLayouts/slideLayout1.xml><?xml version="1.0" encoding="utf-8"?>
-<p:sldLayout xmlns:a="http://schemas.openxmlformats.org/drawingml/2006/main" xmlns:r="http://schemas.openxmlformats.org/officeDocument/2006/relationships" xmlns:p="http://schemas.openxmlformats.org/presentationml/2006/main" xmlns:m="http://schemas.openxmlformats.org/officeDocument/2006/math" xmlns:w="http://schemas.openxmlformats.org/wordprocessingml/2006/main" matchingName="" preserve="1" showMasterPhAnim="0" showMasterSp="1" type="title" userDrawn="1">
+<p:sldLayout xmlns:a="http://schemas.openxmlformats.org/drawingml/2006/main" xmlns:r="http://schemas.openxmlformats.org/officeDocument/2006/relationships" xmlns:p="http://schemas.openxmlformats.org/presentationml/2006/main" showMasterPhAnim="0" type="title" preserve="1" userDrawn="1">
   <p:cSld name="Title Slide">
     <p:spTree>
       <p:nvGrpSpPr>
@@ -1077,7 +1308,6 @@
               <a:rPr lang="en-US"/>
               <a:t>Click to edit Master title style</a:t>
             </a:r>
-            <a:endParaRPr lang="en-US"/>
           </a:p>
         </p:txBody>
       </p:sp>
@@ -1145,7 +1375,6 @@
               <a:rPr lang="en-US"/>
               <a:t>Click to edit Master subtitle style</a:t>
             </a:r>
-            <a:endParaRPr lang="en-US"/>
           </a:p>
         </p:txBody>
       </p:sp>
@@ -1169,7 +1398,7 @@
             </a:pPr>
             <a:fld id="{BCC18F51-09EC-435C-A3BA-64A766E099C0}" type="datetimeFigureOut">
               <a:rPr lang="en-US"/>
-              <a:t>30.10.2013</a:t>
+              <a:t>8/16/2024</a:t>
             </a:fld>
             <a:endParaRPr lang="en-US"/>
           </a:p>
@@ -1232,7 +1461,7 @@
 </file>
 
 <file path=ppt/slideLayouts/slideLayout10.xml><?xml version="1.0" encoding="utf-8"?>
-<p:sldLayout xmlns:a="http://schemas.openxmlformats.org/drawingml/2006/main" xmlns:r="http://schemas.openxmlformats.org/officeDocument/2006/relationships" xmlns:p="http://schemas.openxmlformats.org/presentationml/2006/main" xmlns:m="http://schemas.openxmlformats.org/officeDocument/2006/math" xmlns:w="http://schemas.openxmlformats.org/wordprocessingml/2006/main" matchingName="" preserve="1" showMasterPhAnim="0" showMasterSp="1" type="vertTx" userDrawn="1">
+<p:sldLayout xmlns:a="http://schemas.openxmlformats.org/drawingml/2006/main" xmlns:r="http://schemas.openxmlformats.org/officeDocument/2006/relationships" xmlns:p="http://schemas.openxmlformats.org/presentationml/2006/main" showMasterPhAnim="0" type="vertTx" preserve="1" userDrawn="1">
   <p:cSld name="Title and Vertical Text">
     <p:spTree>
       <p:nvGrpSpPr>
@@ -1270,7 +1499,6 @@
               <a:rPr lang="en-US"/>
               <a:t>Click to edit Master title style</a:t>
             </a:r>
-            <a:endParaRPr lang="en-US"/>
           </a:p>
         </p:txBody>
       </p:sp>
@@ -1336,7 +1564,6 @@
               <a:rPr lang="en-US"/>
               <a:t>Fifth level</a:t>
             </a:r>
-            <a:endParaRPr lang="en-US"/>
           </a:p>
         </p:txBody>
       </p:sp>
@@ -1360,7 +1587,7 @@
             </a:pPr>
             <a:fld id="{BCC18F51-09EC-435C-A3BA-64A766E099C0}" type="datetimeFigureOut">
               <a:rPr lang="en-US"/>
-              <a:t>30.10.2013</a:t>
+              <a:t>8/16/2024</a:t>
             </a:fld>
             <a:endParaRPr lang="en-US"/>
           </a:p>
@@ -1423,7 +1650,7 @@
 </file>
 
 <file path=ppt/slideLayouts/slideLayout11.xml><?xml version="1.0" encoding="utf-8"?>
-<p:sldLayout xmlns:a="http://schemas.openxmlformats.org/drawingml/2006/main" xmlns:r="http://schemas.openxmlformats.org/officeDocument/2006/relationships" xmlns:p="http://schemas.openxmlformats.org/presentationml/2006/main" xmlns:m="http://schemas.openxmlformats.org/officeDocument/2006/math" xmlns:w="http://schemas.openxmlformats.org/wordprocessingml/2006/main" matchingName="" preserve="1" showMasterPhAnim="0" showMasterSp="1" type="vertTitleAndTx" userDrawn="1">
+<p:sldLayout xmlns:a="http://schemas.openxmlformats.org/drawingml/2006/main" xmlns:r="http://schemas.openxmlformats.org/officeDocument/2006/relationships" xmlns:p="http://schemas.openxmlformats.org/presentationml/2006/main" showMasterPhAnim="0" type="vertTitleAndTx" preserve="1" userDrawn="1">
   <p:cSld name="Vertical Title and Text">
     <p:spTree>
       <p:nvGrpSpPr>
@@ -1466,7 +1693,6 @@
               <a:rPr lang="en-US"/>
               <a:t>Click to edit Master title style</a:t>
             </a:r>
-            <a:endParaRPr lang="en-US"/>
           </a:p>
         </p:txBody>
       </p:sp>
@@ -1537,7 +1763,6 @@
               <a:rPr lang="en-US"/>
               <a:t>Fifth level</a:t>
             </a:r>
-            <a:endParaRPr lang="en-US"/>
           </a:p>
         </p:txBody>
       </p:sp>
@@ -1561,7 +1786,7 @@
             </a:pPr>
             <a:fld id="{BCC18F51-09EC-435C-A3BA-64A766E099C0}" type="datetimeFigureOut">
               <a:rPr lang="en-US"/>
-              <a:t>30.10.2013</a:t>
+              <a:t>8/16/2024</a:t>
             </a:fld>
             <a:endParaRPr lang="en-US"/>
           </a:p>
@@ -1624,7 +1849,7 @@
 </file>
 
 <file path=ppt/slideLayouts/slideLayout2.xml><?xml version="1.0" encoding="utf-8"?>
-<p:sldLayout xmlns:a="http://schemas.openxmlformats.org/drawingml/2006/main" xmlns:r="http://schemas.openxmlformats.org/officeDocument/2006/relationships" xmlns:p="http://schemas.openxmlformats.org/presentationml/2006/main" xmlns:m="http://schemas.openxmlformats.org/officeDocument/2006/math" xmlns:w="http://schemas.openxmlformats.org/wordprocessingml/2006/main" matchingName="" preserve="1" showMasterPhAnim="0" showMasterSp="1" type="obj" userDrawn="1">
+<p:sldLayout xmlns:a="http://schemas.openxmlformats.org/drawingml/2006/main" xmlns:r="http://schemas.openxmlformats.org/officeDocument/2006/relationships" xmlns:p="http://schemas.openxmlformats.org/presentationml/2006/main" showMasterPhAnim="0" type="obj" preserve="1" userDrawn="1">
   <p:cSld name="Title and Content">
     <p:spTree>
       <p:nvGrpSpPr>
@@ -1662,7 +1887,6 @@
               <a:rPr lang="en-US"/>
               <a:t>Click to edit Master title style</a:t>
             </a:r>
-            <a:endParaRPr lang="en-US"/>
           </a:p>
         </p:txBody>
       </p:sp>
@@ -1728,7 +1952,6 @@
               <a:rPr lang="en-US"/>
               <a:t>Fifth level</a:t>
             </a:r>
-            <a:endParaRPr lang="en-US"/>
           </a:p>
         </p:txBody>
       </p:sp>
@@ -1752,7 +1975,7 @@
             </a:pPr>
             <a:fld id="{BCC18F51-09EC-435C-A3BA-64A766E099C0}" type="datetimeFigureOut">
               <a:rPr lang="en-US"/>
-              <a:t>30.10.2013</a:t>
+              <a:t>8/16/2024</a:t>
             </a:fld>
             <a:endParaRPr lang="en-US"/>
           </a:p>
@@ -1815,7 +2038,7 @@
 </file>
 
 <file path=ppt/slideLayouts/slideLayout3.xml><?xml version="1.0" encoding="utf-8"?>
-<p:sldLayout xmlns:a="http://schemas.openxmlformats.org/drawingml/2006/main" xmlns:r="http://schemas.openxmlformats.org/officeDocument/2006/relationships" xmlns:p="http://schemas.openxmlformats.org/presentationml/2006/main" xmlns:m="http://schemas.openxmlformats.org/officeDocument/2006/math" xmlns:w="http://schemas.openxmlformats.org/wordprocessingml/2006/main" matchingName="" preserve="1" showMasterPhAnim="0" showMasterSp="1" type="secHead" userDrawn="1">
+<p:sldLayout xmlns:a="http://schemas.openxmlformats.org/drawingml/2006/main" xmlns:r="http://schemas.openxmlformats.org/officeDocument/2006/relationships" xmlns:p="http://schemas.openxmlformats.org/presentationml/2006/main" showMasterPhAnim="0" type="secHead" preserve="1" userDrawn="1">
   <p:cSld name="Section Header">
     <p:spTree>
       <p:nvGrpSpPr>
@@ -1862,7 +2085,6 @@
               <a:rPr lang="en-US"/>
               <a:t>Click to edit Master title style</a:t>
             </a:r>
-            <a:endParaRPr lang="en-US"/>
           </a:p>
         </p:txBody>
       </p:sp>
@@ -2008,7 +2230,7 @@
             </a:pPr>
             <a:fld id="{BCC18F51-09EC-435C-A3BA-64A766E099C0}" type="datetimeFigureOut">
               <a:rPr lang="en-US"/>
-              <a:t>30.10.2013</a:t>
+              <a:t>8/16/2024</a:t>
             </a:fld>
             <a:endParaRPr lang="en-US"/>
           </a:p>
@@ -2071,7 +2293,7 @@
 </file>
 
 <file path=ppt/slideLayouts/slideLayout4.xml><?xml version="1.0" encoding="utf-8"?>
-<p:sldLayout xmlns:a="http://schemas.openxmlformats.org/drawingml/2006/main" xmlns:r="http://schemas.openxmlformats.org/officeDocument/2006/relationships" xmlns:p="http://schemas.openxmlformats.org/presentationml/2006/main" xmlns:m="http://schemas.openxmlformats.org/officeDocument/2006/math" xmlns:w="http://schemas.openxmlformats.org/wordprocessingml/2006/main" matchingName="" preserve="1" showMasterPhAnim="0" showMasterSp="1" type="twoObj" userDrawn="1">
+<p:sldLayout xmlns:a="http://schemas.openxmlformats.org/drawingml/2006/main" xmlns:r="http://schemas.openxmlformats.org/officeDocument/2006/relationships" xmlns:p="http://schemas.openxmlformats.org/presentationml/2006/main" showMasterPhAnim="0" type="twoObj" preserve="1" userDrawn="1">
   <p:cSld name="Two Content">
     <p:spTree>
       <p:nvGrpSpPr>
@@ -2109,7 +2331,6 @@
               <a:rPr lang="en-US"/>
               <a:t>Click to edit Master title style</a:t>
             </a:r>
-            <a:endParaRPr lang="en-US"/>
           </a:p>
         </p:txBody>
       </p:sp>
@@ -2180,7 +2401,6 @@
               <a:rPr lang="en-US"/>
               <a:t>Fifth level</a:t>
             </a:r>
-            <a:endParaRPr lang="en-US"/>
           </a:p>
         </p:txBody>
       </p:sp>
@@ -2251,7 +2471,6 @@
               <a:rPr lang="en-US"/>
               <a:t>Fifth level</a:t>
             </a:r>
-            <a:endParaRPr lang="en-US"/>
           </a:p>
         </p:txBody>
       </p:sp>
@@ -2275,7 +2494,7 @@
             </a:pPr>
             <a:fld id="{BCC18F51-09EC-435C-A3BA-64A766E099C0}" type="datetimeFigureOut">
               <a:rPr lang="en-US"/>
-              <a:t>30.10.2013</a:t>
+              <a:t>8/16/2024</a:t>
             </a:fld>
             <a:endParaRPr lang="en-US"/>
           </a:p>
@@ -2338,7 +2557,7 @@
 </file>
 
 <file path=ppt/slideLayouts/slideLayout5.xml><?xml version="1.0" encoding="utf-8"?>
-<p:sldLayout xmlns:a="http://schemas.openxmlformats.org/drawingml/2006/main" xmlns:r="http://schemas.openxmlformats.org/officeDocument/2006/relationships" xmlns:p="http://schemas.openxmlformats.org/presentationml/2006/main" xmlns:m="http://schemas.openxmlformats.org/officeDocument/2006/math" xmlns:w="http://schemas.openxmlformats.org/wordprocessingml/2006/main" matchingName="" preserve="1" showMasterPhAnim="0" showMasterSp="1" type="twoTxTwoObj" userDrawn="1">
+<p:sldLayout xmlns:a="http://schemas.openxmlformats.org/drawingml/2006/main" xmlns:r="http://schemas.openxmlformats.org/officeDocument/2006/relationships" xmlns:p="http://schemas.openxmlformats.org/presentationml/2006/main" showMasterPhAnim="0" type="twoTxTwoObj" preserve="1" userDrawn="1">
   <p:cSld name="Comparison">
     <p:spTree>
       <p:nvGrpSpPr>
@@ -2381,7 +2600,6 @@
               <a:rPr lang="en-US"/>
               <a:t>Click to edit Master title style</a:t>
             </a:r>
-            <a:endParaRPr lang="en-US"/>
           </a:p>
         </p:txBody>
       </p:sp>
@@ -2520,7 +2738,6 @@
               <a:rPr lang="en-US"/>
               <a:t>Fifth level</a:t>
             </a:r>
-            <a:endParaRPr lang="en-US"/>
           </a:p>
         </p:txBody>
       </p:sp>
@@ -2659,7 +2876,6 @@
               <a:rPr lang="en-US"/>
               <a:t>Fifth level</a:t>
             </a:r>
-            <a:endParaRPr lang="en-US"/>
           </a:p>
         </p:txBody>
       </p:sp>
@@ -2683,7 +2899,7 @@
             </a:pPr>
             <a:fld id="{BCC18F51-09EC-435C-A3BA-64A766E099C0}" type="datetimeFigureOut">
               <a:rPr lang="en-US"/>
-              <a:t>30.10.2013</a:t>
+              <a:t>8/16/2024</a:t>
             </a:fld>
             <a:endParaRPr lang="en-US"/>
           </a:p>
@@ -2746,7 +2962,7 @@
 </file>
 
 <file path=ppt/slideLayouts/slideLayout6.xml><?xml version="1.0" encoding="utf-8"?>
-<p:sldLayout xmlns:a="http://schemas.openxmlformats.org/drawingml/2006/main" xmlns:r="http://schemas.openxmlformats.org/officeDocument/2006/relationships" xmlns:p="http://schemas.openxmlformats.org/presentationml/2006/main" xmlns:m="http://schemas.openxmlformats.org/officeDocument/2006/math" xmlns:w="http://schemas.openxmlformats.org/wordprocessingml/2006/main" matchingName="" preserve="1" showMasterPhAnim="0" showMasterSp="1" type="titleOnly" userDrawn="1">
+<p:sldLayout xmlns:a="http://schemas.openxmlformats.org/drawingml/2006/main" xmlns:r="http://schemas.openxmlformats.org/officeDocument/2006/relationships" xmlns:p="http://schemas.openxmlformats.org/presentationml/2006/main" showMasterPhAnim="0" type="titleOnly" preserve="1" userDrawn="1">
   <p:cSld name="Title Only">
     <p:spTree>
       <p:nvGrpSpPr>
@@ -2784,7 +3000,6 @@
               <a:rPr lang="en-US"/>
               <a:t>Click to edit Master title style</a:t>
             </a:r>
-            <a:endParaRPr lang="en-US"/>
           </a:p>
         </p:txBody>
       </p:sp>
@@ -2808,7 +3023,7 @@
             </a:pPr>
             <a:fld id="{BCC18F51-09EC-435C-A3BA-64A766E099C0}" type="datetimeFigureOut">
               <a:rPr lang="en-US"/>
-              <a:t>30.10.2013</a:t>
+              <a:t>8/16/2024</a:t>
             </a:fld>
             <a:endParaRPr lang="en-US"/>
           </a:p>
@@ -2871,7 +3086,7 @@
 </file>
 
 <file path=ppt/slideLayouts/slideLayout7.xml><?xml version="1.0" encoding="utf-8"?>
-<p:sldLayout xmlns:a="http://schemas.openxmlformats.org/drawingml/2006/main" xmlns:r="http://schemas.openxmlformats.org/officeDocument/2006/relationships" xmlns:p="http://schemas.openxmlformats.org/presentationml/2006/main" xmlns:m="http://schemas.openxmlformats.org/officeDocument/2006/math" xmlns:w="http://schemas.openxmlformats.org/wordprocessingml/2006/main" matchingName="" preserve="1" showMasterPhAnim="0" showMasterSp="1" type="blank" userDrawn="1">
+<p:sldLayout xmlns:a="http://schemas.openxmlformats.org/drawingml/2006/main" xmlns:r="http://schemas.openxmlformats.org/officeDocument/2006/relationships" xmlns:p="http://schemas.openxmlformats.org/presentationml/2006/main" showMasterPhAnim="0" type="blank" preserve="1" userDrawn="1">
   <p:cSld name="Blank">
     <p:spTree>
       <p:nvGrpSpPr>
@@ -2907,7 +3122,7 @@
             </a:pPr>
             <a:fld id="{BCC18F51-09EC-435C-A3BA-64A766E099C0}" type="datetimeFigureOut">
               <a:rPr lang="en-US"/>
-              <a:t>30.10.2013</a:t>
+              <a:t>8/16/2024</a:t>
             </a:fld>
             <a:endParaRPr lang="en-US"/>
           </a:p>
@@ -2970,7 +3185,7 @@
 </file>
 
 <file path=ppt/slideLayouts/slideLayout8.xml><?xml version="1.0" encoding="utf-8"?>
-<p:sldLayout xmlns:a="http://schemas.openxmlformats.org/drawingml/2006/main" xmlns:r="http://schemas.openxmlformats.org/officeDocument/2006/relationships" xmlns:p="http://schemas.openxmlformats.org/presentationml/2006/main" xmlns:m="http://schemas.openxmlformats.org/officeDocument/2006/math" xmlns:w="http://schemas.openxmlformats.org/wordprocessingml/2006/main" matchingName="" preserve="1" showMasterPhAnim="0" showMasterSp="1" type="objTx" userDrawn="1">
+<p:sldLayout xmlns:a="http://schemas.openxmlformats.org/drawingml/2006/main" xmlns:r="http://schemas.openxmlformats.org/officeDocument/2006/relationships" xmlns:p="http://schemas.openxmlformats.org/presentationml/2006/main" showMasterPhAnim="0" type="objTx" preserve="1" userDrawn="1">
   <p:cSld name="Content with Caption">
     <p:spTree>
       <p:nvGrpSpPr>
@@ -3017,7 +3232,6 @@
               <a:rPr lang="en-US"/>
               <a:t>Click to edit Master title style</a:t>
             </a:r>
-            <a:endParaRPr lang="en-US"/>
           </a:p>
         </p:txBody>
       </p:sp>
@@ -3116,7 +3330,6 @@
               <a:rPr lang="en-US"/>
               <a:t>Fifth level</a:t>
             </a:r>
-            <a:endParaRPr lang="en-US"/>
           </a:p>
         </p:txBody>
       </p:sp>
@@ -3208,7 +3421,7 @@
             </a:pPr>
             <a:fld id="{BCC18F51-09EC-435C-A3BA-64A766E099C0}" type="datetimeFigureOut">
               <a:rPr lang="en-US"/>
-              <a:t>30.10.2013</a:t>
+              <a:t>8/16/2024</a:t>
             </a:fld>
             <a:endParaRPr lang="en-US"/>
           </a:p>
@@ -3271,7 +3484,7 @@
 </file>
 
 <file path=ppt/slideLayouts/slideLayout9.xml><?xml version="1.0" encoding="utf-8"?>
-<p:sldLayout xmlns:a="http://schemas.openxmlformats.org/drawingml/2006/main" xmlns:r="http://schemas.openxmlformats.org/officeDocument/2006/relationships" xmlns:p="http://schemas.openxmlformats.org/presentationml/2006/main" xmlns:m="http://schemas.openxmlformats.org/officeDocument/2006/math" xmlns:w="http://schemas.openxmlformats.org/wordprocessingml/2006/main" matchingName="" preserve="1" showMasterPhAnim="0" showMasterSp="1" type="picTx" userDrawn="1">
+<p:sldLayout xmlns:a="http://schemas.openxmlformats.org/drawingml/2006/main" xmlns:r="http://schemas.openxmlformats.org/officeDocument/2006/relationships" xmlns:p="http://schemas.openxmlformats.org/presentationml/2006/main" showMasterPhAnim="0" type="picTx" preserve="1" userDrawn="1">
   <p:cSld name="Picture with Caption">
     <p:spTree>
       <p:nvGrpSpPr>
@@ -3318,7 +3531,6 @@
               <a:rPr lang="en-US"/>
               <a:t>Click to edit Master title style</a:t>
             </a:r>
-            <a:endParaRPr lang="en-US"/>
           </a:p>
         </p:txBody>
       </p:sp>
@@ -3326,7 +3538,7 @@
         <p:nvSpPr>
           <p:cNvPr id="3" name="Picture Placeholder 2"/>
           <p:cNvSpPr>
-            <a:spLocks noChangeAspect="1" noGrp="1"/>
+            <a:spLocks noGrp="1" noChangeAspect="1"/>
           </p:cNvSpPr>
           <p:nvPr>
             <p:ph type="pic" idx="1"/>
@@ -3386,7 +3598,6 @@
               <a:rPr lang="en-US"/>
               <a:t>Click icon to add picture</a:t>
             </a:r>
-            <a:endParaRPr lang="en-US"/>
           </a:p>
         </p:txBody>
       </p:sp>
@@ -3478,7 +3689,7 @@
             </a:pPr>
             <a:fld id="{BCC18F51-09EC-435C-A3BA-64A766E099C0}" type="datetimeFigureOut">
               <a:rPr lang="en-US"/>
-              <a:t>30.10.2013</a:t>
+              <a:t>8/16/2024</a:t>
             </a:fld>
             <a:endParaRPr lang="en-US"/>
           </a:p>
@@ -3541,8 +3752,8 @@
 </file>
 
 <file path=ppt/slideMasters/slideMaster1.xml><?xml version="1.0" encoding="utf-8"?>
-<p:sldMaster xmlns:a="http://schemas.openxmlformats.org/drawingml/2006/main" xmlns:r="http://schemas.openxmlformats.org/officeDocument/2006/relationships" xmlns:p="http://schemas.openxmlformats.org/presentationml/2006/main" xmlns:m="http://schemas.openxmlformats.org/officeDocument/2006/math" xmlns:w="http://schemas.openxmlformats.org/wordprocessingml/2006/main" preserve="0">
-  <p:cSld name="">
+<p:sldMaster xmlns:a="http://schemas.openxmlformats.org/drawingml/2006/main" xmlns:r="http://schemas.openxmlformats.org/officeDocument/2006/relationships" xmlns:p="http://schemas.openxmlformats.org/presentationml/2006/main">
+  <p:cSld>
     <p:bg>
       <p:bgRef idx="1001">
         <a:schemeClr val="bg1"/>
@@ -3594,7 +3805,6 @@
               <a:rPr lang="en-US"/>
               <a:t>Click to edit Master title style</a:t>
             </a:r>
-            <a:endParaRPr lang="en-US"/>
           </a:p>
         </p:txBody>
       </p:sp>
@@ -3670,7 +3880,6 @@
               <a:rPr lang="en-US"/>
               <a:t>Fifth level</a:t>
             </a:r>
-            <a:endParaRPr lang="en-US"/>
           </a:p>
         </p:txBody>
       </p:sp>
@@ -3712,7 +3921,7 @@
             </a:pPr>
             <a:fld id="{BCC18F51-09EC-435C-A3BA-64A766E099C0}" type="datetimeFigureOut">
               <a:rPr lang="en-US"/>
-              <a:t>30.10.2013</a:t>
+              <a:t>8/16/2024</a:t>
             </a:fld>
             <a:endParaRPr lang="en-US"/>
           </a:p>
@@ -4102,13 +4311,14 @@
 </file>
 
 <file path=ppt/slides/slide1.xml><?xml version="1.0" encoding="utf-8"?>
-<p:sld xmlns:a="http://schemas.openxmlformats.org/drawingml/2006/main" xmlns:r="http://schemas.openxmlformats.org/officeDocument/2006/relationships" xmlns:p="http://schemas.openxmlformats.org/presentationml/2006/main" xmlns:m="http://schemas.openxmlformats.org/officeDocument/2006/math" xmlns:w="http://schemas.openxmlformats.org/wordprocessingml/2006/main" xmlns:mc="http://schemas.openxmlformats.org/markup-compatibility/2006" showMasterPhAnim="0" showMasterSp="1" show="1">
-  <p:cSld name="">
+<p:sld xmlns:a="http://schemas.openxmlformats.org/drawingml/2006/main" xmlns:r="http://schemas.openxmlformats.org/officeDocument/2006/relationships" xmlns:p="http://schemas.openxmlformats.org/presentationml/2006/main" showMasterPhAnim="0">
+  <p:cSld>
     <p:bg>
-      <p:bgPr shadeToTitle="0">
+      <p:bgPr>
         <a:solidFill>
           <a:srgbClr val="3D3028"/>
         </a:solidFill>
+        <a:effectLst/>
       </p:bgPr>
     </p:bg>
     <p:spTree>
@@ -4219,13 +4429,6 @@
               </a:rPr>
               <a:t>name</a:t>
             </a:r>
-            <a:endParaRPr>
-              <a:solidFill>
-                <a:schemeClr val="bg1">
-                  <a:lumMod val="95000"/>
-                </a:schemeClr>
-              </a:solidFill>
-            </a:endParaRPr>
           </a:p>
           <a:p>
             <a:pPr>
@@ -4241,13 +4444,6 @@
               </a:rPr>
               <a:t>rgb()</a:t>
             </a:r>
-            <a:endParaRPr>
-              <a:solidFill>
-                <a:schemeClr val="bg1">
-                  <a:lumMod val="95000"/>
-                </a:schemeClr>
-              </a:solidFill>
-            </a:endParaRPr>
           </a:p>
           <a:p>
             <a:pPr>
@@ -4263,13 +4459,6 @@
               </a:rPr>
               <a:t>hex</a:t>
             </a:r>
-            <a:endParaRPr>
-              <a:solidFill>
-                <a:schemeClr val="bg1">
-                  <a:lumMod val="95000"/>
-                </a:schemeClr>
-              </a:solidFill>
-            </a:endParaRPr>
           </a:p>
           <a:p>
             <a:pPr>
@@ -4285,13 +4474,6 @@
               </a:rPr>
               <a:t>hsl()</a:t>
             </a:r>
-            <a:endParaRPr>
-              <a:solidFill>
-                <a:schemeClr val="bg1">
-                  <a:lumMod val="95000"/>
-                </a:schemeClr>
-              </a:solidFill>
-            </a:endParaRPr>
           </a:p>
         </p:txBody>
       </p:sp>
@@ -4300,25 +4482,18 @@
   <p:clrMapOvr>
     <a:masterClrMapping/>
   </p:clrMapOvr>
-  <mc:AlternateContent xmlns:mc="http://schemas.openxmlformats.org/markup-compatibility/2006">
-    <mc:Choice xmlns:p159="http://schemas.microsoft.com/office/powerpoint/2015/09/main" xmlns:p14="http://schemas.microsoft.com/office/powerpoint/2010/main" Requires="p159">
-      <p:transition p14:dur="2000" advClick="1"/>
-    </mc:Choice>
-    <mc:Fallback>
-      <p:transition advClick="1"/>
-    </mc:Fallback>
-  </mc:AlternateContent>
 </p:sld>
 </file>
 
 <file path=ppt/slides/slide2.xml><?xml version="1.0" encoding="utf-8"?>
-<p:sld xmlns:a="http://schemas.openxmlformats.org/drawingml/2006/main" xmlns:r="http://schemas.openxmlformats.org/officeDocument/2006/relationships" xmlns:p="http://schemas.openxmlformats.org/presentationml/2006/main" xmlns:m="http://schemas.openxmlformats.org/officeDocument/2006/math" xmlns:w="http://schemas.openxmlformats.org/wordprocessingml/2006/main" xmlns:mc="http://schemas.openxmlformats.org/markup-compatibility/2006" showMasterPhAnim="0" showMasterSp="1" show="1">
-  <p:cSld name="">
+<p:sld xmlns:a="http://schemas.openxmlformats.org/drawingml/2006/main" xmlns:r="http://schemas.openxmlformats.org/officeDocument/2006/relationships" xmlns:p="http://schemas.openxmlformats.org/presentationml/2006/main" showMasterPhAnim="0">
+  <p:cSld>
     <p:bg>
-      <p:bgPr shadeToTitle="0">
+      <p:bgPr>
         <a:solidFill>
           <a:srgbClr val="3D3028"/>
         </a:solidFill>
+        <a:effectLst/>
       </p:bgPr>
     </p:bg>
     <p:spTree>
@@ -4429,13 +4604,6 @@
               </a:rPr>
               <a:t>:hover</a:t>
             </a:r>
-            <a:endParaRPr>
-              <a:solidFill>
-                <a:schemeClr val="bg1">
-                  <a:lumMod val="95000"/>
-                </a:schemeClr>
-              </a:solidFill>
-            </a:endParaRPr>
           </a:p>
           <a:p>
             <a:pPr>
@@ -4451,13 +4619,6 @@
               </a:rPr>
               <a:t>:focus</a:t>
             </a:r>
-            <a:endParaRPr>
-              <a:solidFill>
-                <a:schemeClr val="bg1">
-                  <a:lumMod val="95000"/>
-                </a:schemeClr>
-              </a:solidFill>
-            </a:endParaRPr>
           </a:p>
           <a:p>
             <a:pPr>
@@ -4473,13 +4634,6 @@
               </a:rPr>
               <a:t>:disable</a:t>
             </a:r>
-            <a:endParaRPr>
-              <a:solidFill>
-                <a:schemeClr val="bg1">
-                  <a:lumMod val="95000"/>
-                </a:schemeClr>
-              </a:solidFill>
-            </a:endParaRPr>
           </a:p>
           <a:p>
             <a:pPr>
@@ -4495,13 +4649,6 @@
               </a:rPr>
               <a:t>:required</a:t>
             </a:r>
-            <a:endParaRPr>
-              <a:solidFill>
-                <a:schemeClr val="bg1">
-                  <a:lumMod val="95000"/>
-                </a:schemeClr>
-              </a:solidFill>
-            </a:endParaRPr>
           </a:p>
           <a:p>
             <a:pPr>
@@ -4531,13 +4678,6 @@
               </a:rPr>
               <a:t>.....more</a:t>
             </a:r>
-            <a:endParaRPr>
-              <a:solidFill>
-                <a:schemeClr val="bg1">
-                  <a:lumMod val="95000"/>
-                </a:schemeClr>
-              </a:solidFill>
-            </a:endParaRPr>
           </a:p>
         </p:txBody>
       </p:sp>
@@ -4546,25 +4686,18 @@
   <p:clrMapOvr>
     <a:masterClrMapping/>
   </p:clrMapOvr>
-  <mc:AlternateContent xmlns:mc="http://schemas.openxmlformats.org/markup-compatibility/2006">
-    <mc:Choice xmlns:p159="http://schemas.microsoft.com/office/powerpoint/2015/09/main" xmlns:p14="http://schemas.microsoft.com/office/powerpoint/2010/main" Requires="p159">
-      <p:transition p14:dur="2000" advClick="1"/>
-    </mc:Choice>
-    <mc:Fallback>
-      <p:transition advClick="1"/>
-    </mc:Fallback>
-  </mc:AlternateContent>
 </p:sld>
 </file>
 
 <file path=ppt/slides/slide3.xml><?xml version="1.0" encoding="utf-8"?>
-<p:sld xmlns:a="http://schemas.openxmlformats.org/drawingml/2006/main" xmlns:r="http://schemas.openxmlformats.org/officeDocument/2006/relationships" xmlns:p="http://schemas.openxmlformats.org/presentationml/2006/main" xmlns:m="http://schemas.openxmlformats.org/officeDocument/2006/math" xmlns:w="http://schemas.openxmlformats.org/wordprocessingml/2006/main" xmlns:mc="http://schemas.openxmlformats.org/markup-compatibility/2006" showMasterPhAnim="0" showMasterSp="1" show="1">
-  <p:cSld name="">
+<p:sld xmlns:a="http://schemas.openxmlformats.org/drawingml/2006/main" xmlns:r="http://schemas.openxmlformats.org/officeDocument/2006/relationships" xmlns:p="http://schemas.openxmlformats.org/presentationml/2006/main" showMasterPhAnim="0">
+  <p:cSld>
     <p:bg>
-      <p:bgPr shadeToTitle="0">
+      <p:bgPr>
         <a:solidFill>
           <a:srgbClr val="3D3028"/>
         </a:solidFill>
+        <a:effectLst/>
       </p:bgPr>
     </p:bg>
     <p:spTree>
@@ -4675,13 +4808,6 @@
               </a:rPr>
               <a:t>:first-child</a:t>
             </a:r>
-            <a:endParaRPr>
-              <a:solidFill>
-                <a:schemeClr val="bg1">
-                  <a:lumMod val="95000"/>
-                </a:schemeClr>
-              </a:solidFill>
-            </a:endParaRPr>
           </a:p>
           <a:p>
             <a:pPr>
@@ -4697,13 +4823,6 @@
               </a:rPr>
               <a:t>:last-child</a:t>
             </a:r>
-            <a:endParaRPr>
-              <a:solidFill>
-                <a:schemeClr val="bg1">
-                  <a:lumMod val="95000"/>
-                </a:schemeClr>
-              </a:solidFill>
-            </a:endParaRPr>
           </a:p>
           <a:p>
             <a:pPr>
@@ -4719,13 +4838,6 @@
               </a:rPr>
               <a:t>:n-th-child</a:t>
             </a:r>
-            <a:endParaRPr>
-              <a:solidFill>
-                <a:schemeClr val="bg1">
-                  <a:lumMod val="95000"/>
-                </a:schemeClr>
-              </a:solidFill>
-            </a:endParaRPr>
           </a:p>
           <a:p>
             <a:pPr>
@@ -4741,13 +4853,6 @@
               </a:rPr>
               <a:t>:first-of-type</a:t>
             </a:r>
-            <a:endParaRPr>
-              <a:solidFill>
-                <a:schemeClr val="bg1">
-                  <a:lumMod val="95000"/>
-                </a:schemeClr>
-              </a:solidFill>
-            </a:endParaRPr>
           </a:p>
           <a:p>
             <a:pPr>
@@ -4763,13 +4868,6 @@
               </a:rPr>
               <a:t>:last-of-type</a:t>
             </a:r>
-            <a:endParaRPr>
-              <a:solidFill>
-                <a:schemeClr val="bg1">
-                  <a:lumMod val="95000"/>
-                </a:schemeClr>
-              </a:solidFill>
-            </a:endParaRPr>
           </a:p>
           <a:p>
             <a:pPr>
@@ -4785,13 +4883,6 @@
               </a:rPr>
               <a:t>:n-th-child(2n)</a:t>
             </a:r>
-            <a:endParaRPr>
-              <a:solidFill>
-                <a:schemeClr val="bg1">
-                  <a:lumMod val="95000"/>
-                </a:schemeClr>
-              </a:solidFill>
-            </a:endParaRPr>
           </a:p>
         </p:txBody>
       </p:sp>
@@ -4800,25 +4891,18 @@
   <p:clrMapOvr>
     <a:masterClrMapping/>
   </p:clrMapOvr>
-  <mc:AlternateContent xmlns:mc="http://schemas.openxmlformats.org/markup-compatibility/2006">
-    <mc:Choice xmlns:p159="http://schemas.microsoft.com/office/powerpoint/2015/09/main" xmlns:p14="http://schemas.microsoft.com/office/powerpoint/2010/main" Requires="p159">
-      <p:transition p14:dur="2000" advClick="1"/>
-    </mc:Choice>
-    <mc:Fallback>
-      <p:transition advClick="1"/>
-    </mc:Fallback>
-  </mc:AlternateContent>
 </p:sld>
 </file>
 
 <file path=ppt/slides/slide4.xml><?xml version="1.0" encoding="utf-8"?>
-<p:sld xmlns:a="http://schemas.openxmlformats.org/drawingml/2006/main" xmlns:r="http://schemas.openxmlformats.org/officeDocument/2006/relationships" xmlns:p="http://schemas.openxmlformats.org/presentationml/2006/main" xmlns:m="http://schemas.openxmlformats.org/officeDocument/2006/math" xmlns:w="http://schemas.openxmlformats.org/wordprocessingml/2006/main" xmlns:mc="http://schemas.openxmlformats.org/markup-compatibility/2006" showMasterPhAnim="0" showMasterSp="1" show="1">
-  <p:cSld name="">
+<p:sld xmlns:a="http://schemas.openxmlformats.org/drawingml/2006/main" xmlns:r="http://schemas.openxmlformats.org/officeDocument/2006/relationships" xmlns:p="http://schemas.openxmlformats.org/presentationml/2006/main" showMasterPhAnim="0">
+  <p:cSld>
     <p:bg>
-      <p:bgPr shadeToTitle="0">
+      <p:bgPr>
         <a:solidFill>
           <a:srgbClr val="3D3028"/>
         </a:solidFill>
+        <a:effectLst/>
       </p:bgPr>
     </p:bg>
     <p:spTree>
@@ -4929,13 +5013,6 @@
               </a:rPr>
               <a:t>Margin</a:t>
             </a:r>
-            <a:endParaRPr>
-              <a:solidFill>
-                <a:schemeClr val="bg1">
-                  <a:lumMod val="95000"/>
-                </a:schemeClr>
-              </a:solidFill>
-            </a:endParaRPr>
           </a:p>
           <a:p>
             <a:pPr>
@@ -4951,13 +5028,6 @@
               </a:rPr>
               <a:t>Padding</a:t>
             </a:r>
-            <a:endParaRPr>
-              <a:solidFill>
-                <a:schemeClr val="bg1">
-                  <a:lumMod val="95000"/>
-                </a:schemeClr>
-              </a:solidFill>
-            </a:endParaRPr>
           </a:p>
           <a:p>
             <a:pPr>
@@ -4973,13 +5043,6 @@
               </a:rPr>
               <a:t>Border</a:t>
             </a:r>
-            <a:endParaRPr>
-              <a:solidFill>
-                <a:schemeClr val="bg1">
-                  <a:lumMod val="95000"/>
-                </a:schemeClr>
-              </a:solidFill>
-            </a:endParaRPr>
           </a:p>
           <a:p>
             <a:pPr>
@@ -4995,6 +5058,13 @@
               </a:rPr>
               <a:t>—box-sizing</a:t>
             </a:r>
+          </a:p>
+          <a:p>
+            <a:pPr marL="0" indent="0">
+              <a:buFont typeface="Arial"/>
+              <a:buNone/>
+              <a:defRPr/>
+            </a:pPr>
             <a:endParaRPr>
               <a:solidFill>
                 <a:schemeClr val="bg1">
@@ -5003,20 +5073,6 @@
               </a:solidFill>
             </a:endParaRPr>
           </a:p>
-          <a:p>
-            <a:pPr marL="0" indent="0">
-              <a:buFont typeface="Arial"/>
-              <a:buNone/>
-              <a:defRPr/>
-            </a:pPr>
-            <a:endParaRPr>
-              <a:solidFill>
-                <a:schemeClr val="bg1">
-                  <a:lumMod val="95000"/>
-                </a:schemeClr>
-              </a:solidFill>
-            </a:endParaRPr>
-          </a:p>
         </p:txBody>
       </p:sp>
     </p:spTree>
@@ -5024,25 +5080,18 @@
   <p:clrMapOvr>
     <a:masterClrMapping/>
   </p:clrMapOvr>
-  <mc:AlternateContent xmlns:mc="http://schemas.openxmlformats.org/markup-compatibility/2006">
-    <mc:Choice xmlns:p159="http://schemas.microsoft.com/office/powerpoint/2015/09/main" xmlns:p14="http://schemas.microsoft.com/office/powerpoint/2010/main" Requires="p159">
-      <p:transition p14:dur="2000" advClick="1"/>
-    </mc:Choice>
-    <mc:Fallback>
-      <p:transition advClick="1"/>
-    </mc:Fallback>
-  </mc:AlternateContent>
 </p:sld>
 </file>
 
 <file path=ppt/slides/slide5.xml><?xml version="1.0" encoding="utf-8"?>
-<p:sld xmlns:a="http://schemas.openxmlformats.org/drawingml/2006/main" xmlns:r="http://schemas.openxmlformats.org/officeDocument/2006/relationships" xmlns:p="http://schemas.openxmlformats.org/presentationml/2006/main" xmlns:m="http://schemas.openxmlformats.org/officeDocument/2006/math" xmlns:w="http://schemas.openxmlformats.org/wordprocessingml/2006/main" xmlns:mc="http://schemas.openxmlformats.org/markup-compatibility/2006" showMasterPhAnim="0" showMasterSp="1" show="1">
-  <p:cSld name="">
+<p:sld xmlns:a="http://schemas.openxmlformats.org/drawingml/2006/main" xmlns:r="http://schemas.openxmlformats.org/officeDocument/2006/relationships" xmlns:p="http://schemas.openxmlformats.org/presentationml/2006/main" showMasterPhAnim="0">
+  <p:cSld>
     <p:bg>
-      <p:bgPr shadeToTitle="0">
+      <p:bgPr>
         <a:solidFill>
           <a:srgbClr val="3D3028"/>
         </a:solidFill>
+        <a:effectLst/>
       </p:bgPr>
     </p:bg>
     <p:spTree>
@@ -5153,13 +5202,6 @@
               </a:rPr>
               <a:t>cm, m (Never Use)</a:t>
             </a:r>
-            <a:endParaRPr>
-              <a:solidFill>
-                <a:schemeClr val="bg1">
-                  <a:lumMod val="95000"/>
-                </a:schemeClr>
-              </a:solidFill>
-            </a:endParaRPr>
           </a:p>
           <a:p>
             <a:pPr>
@@ -5175,13 +5217,6 @@
               </a:rPr>
               <a:t>px</a:t>
             </a:r>
-            <a:endParaRPr>
-              <a:solidFill>
-                <a:schemeClr val="bg1">
-                  <a:lumMod val="95000"/>
-                </a:schemeClr>
-              </a:solidFill>
-            </a:endParaRPr>
           </a:p>
           <a:p>
             <a:pPr>
@@ -5197,13 +5232,6 @@
               </a:rPr>
               <a:t>vw</a:t>
             </a:r>
-            <a:endParaRPr>
-              <a:solidFill>
-                <a:schemeClr val="bg1">
-                  <a:lumMod val="95000"/>
-                </a:schemeClr>
-              </a:solidFill>
-            </a:endParaRPr>
           </a:p>
           <a:p>
             <a:pPr>
@@ -5219,13 +5247,6 @@
               </a:rPr>
               <a:t>vh</a:t>
             </a:r>
-            <a:endParaRPr>
-              <a:solidFill>
-                <a:schemeClr val="bg1">
-                  <a:lumMod val="95000"/>
-                </a:schemeClr>
-              </a:solidFill>
-            </a:endParaRPr>
           </a:p>
           <a:p>
             <a:pPr>
@@ -5241,13 +5262,6 @@
               </a:rPr>
               <a:t>%</a:t>
             </a:r>
-            <a:endParaRPr>
-              <a:solidFill>
-                <a:schemeClr val="bg1">
-                  <a:lumMod val="95000"/>
-                </a:schemeClr>
-              </a:solidFill>
-            </a:endParaRPr>
           </a:p>
           <a:p>
             <a:pPr>
@@ -5263,13 +5277,6 @@
               </a:rPr>
               <a:t>rem</a:t>
             </a:r>
-            <a:endParaRPr>
-              <a:solidFill>
-                <a:schemeClr val="bg1">
-                  <a:lumMod val="95000"/>
-                </a:schemeClr>
-              </a:solidFill>
-            </a:endParaRPr>
           </a:p>
           <a:p>
             <a:pPr>
@@ -5285,6 +5292,13 @@
               </a:rPr>
               <a:t>em</a:t>
             </a:r>
+          </a:p>
+          <a:p>
+            <a:pPr marL="0" indent="0">
+              <a:buFont typeface="Arial"/>
+              <a:buNone/>
+              <a:defRPr/>
+            </a:pPr>
             <a:endParaRPr>
               <a:solidFill>
                 <a:schemeClr val="bg1">
@@ -5293,20 +5307,6 @@
               </a:solidFill>
             </a:endParaRPr>
           </a:p>
-          <a:p>
-            <a:pPr marL="0" indent="0">
-              <a:buFont typeface="Arial"/>
-              <a:buNone/>
-              <a:defRPr/>
-            </a:pPr>
-            <a:endParaRPr>
-              <a:solidFill>
-                <a:schemeClr val="bg1">
-                  <a:lumMod val="95000"/>
-                </a:schemeClr>
-              </a:solidFill>
-            </a:endParaRPr>
-          </a:p>
         </p:txBody>
       </p:sp>
     </p:spTree>
@@ -5314,25 +5314,18 @@
   <p:clrMapOvr>
     <a:masterClrMapping/>
   </p:clrMapOvr>
-  <mc:AlternateContent xmlns:mc="http://schemas.openxmlformats.org/markup-compatibility/2006">
-    <mc:Choice xmlns:p159="http://schemas.microsoft.com/office/powerpoint/2015/09/main" xmlns:p14="http://schemas.microsoft.com/office/powerpoint/2010/main" Requires="p159">
-      <p:transition p14:dur="2000" advClick="1"/>
-    </mc:Choice>
-    <mc:Fallback>
-      <p:transition advClick="1"/>
-    </mc:Fallback>
-  </mc:AlternateContent>
 </p:sld>
 </file>
 
 <file path=ppt/slides/slide6.xml><?xml version="1.0" encoding="utf-8"?>
-<p:sld xmlns:a="http://schemas.openxmlformats.org/drawingml/2006/main" xmlns:r="http://schemas.openxmlformats.org/officeDocument/2006/relationships" xmlns:p="http://schemas.openxmlformats.org/presentationml/2006/main" xmlns:m="http://schemas.openxmlformats.org/officeDocument/2006/math" xmlns:w="http://schemas.openxmlformats.org/wordprocessingml/2006/main" xmlns:mc="http://schemas.openxmlformats.org/markup-compatibility/2006" showMasterPhAnim="0" showMasterSp="1" show="1">
-  <p:cSld name="">
+<p:sld xmlns:a="http://schemas.openxmlformats.org/drawingml/2006/main" xmlns:r="http://schemas.openxmlformats.org/officeDocument/2006/relationships" xmlns:p="http://schemas.openxmlformats.org/presentationml/2006/main" showMasterPhAnim="0">
+  <p:cSld>
     <p:bg>
-      <p:bgPr shadeToTitle="0">
+      <p:bgPr>
         <a:solidFill>
           <a:srgbClr val="3D3028"/>
         </a:solidFill>
+        <a:effectLst/>
       </p:bgPr>
     </p:bg>
     <p:spTree>
@@ -5371,6 +5364,269 @@
               <a:defRPr/>
             </a:pPr>
             <a:r>
+              <a:rPr lang="en-US" sz="4400" b="0" i="0" u="sng" strike="noStrike" cap="none" spc="0" dirty="0">
+                <a:solidFill>
+                  <a:schemeClr val="accent4">
+                    <a:lumMod val="40000"/>
+                    <a:lumOff val="60000"/>
+                  </a:schemeClr>
+                </a:solidFill>
+                <a:latin typeface="Open Sans"/>
+                <a:ea typeface="Open Sans"/>
+                <a:cs typeface="Open Sans"/>
+              </a:rPr>
+              <a:t>Flexbox</a:t>
+            </a:r>
+            <a:endParaRPr sz="4400" u="sng" dirty="0">
+              <a:solidFill>
+                <a:schemeClr val="bg1">
+                  <a:lumMod val="95000"/>
+                </a:schemeClr>
+              </a:solidFill>
+              <a:latin typeface="Open Sans"/>
+              <a:cs typeface="Open Sans"/>
+            </a:endParaRPr>
+          </a:p>
+          <a:p>
+            <a:pPr>
+              <a:defRPr/>
+            </a:pPr>
+            <a:endParaRPr dirty="0"/>
+          </a:p>
+        </p:txBody>
+      </p:sp>
+      <p:sp>
+        <p:nvSpPr>
+          <p:cNvPr id="3" name="Content Placeholder 2">
+            <a:extLst>
+              <a:ext uri="{FF2B5EF4-FFF2-40B4-BE49-F238E27FC236}">
+                <a16:creationId xmlns:a16="http://schemas.microsoft.com/office/drawing/2014/main" id="{2596249A-8EDF-8488-153F-36FADFE38C29}"/>
+              </a:ext>
+            </a:extLst>
+          </p:cNvPr>
+          <p:cNvSpPr>
+            <a:spLocks noGrp="1"/>
+          </p:cNvSpPr>
+          <p:nvPr>
+            <p:ph idx="1"/>
+          </p:nvPr>
+        </p:nvSpPr>
+        <p:spPr>
+          <a:xfrm>
+            <a:off x="838200" y="1307161"/>
+            <a:ext cx="10515600" cy="4869802"/>
+          </a:xfrm>
+        </p:spPr>
+        <p:txBody>
+          <a:bodyPr/>
+          <a:lstStyle/>
+          <a:p>
+            <a:pPr marL="0" indent="0">
+              <a:buNone/>
+            </a:pPr>
+            <a:r>
+              <a:rPr lang="en-GB" dirty="0">
+                <a:solidFill>
+                  <a:schemeClr val="bg1">
+                    <a:lumMod val="85000"/>
+                  </a:schemeClr>
+                </a:solidFill>
+              </a:rPr>
+              <a:t>One-dimensional layout method for arranging items in rows or columns</a:t>
+            </a:r>
+            <a:endParaRPr lang="en-IN" dirty="0">
+              <a:solidFill>
+                <a:schemeClr val="bg1">
+                  <a:lumMod val="85000"/>
+                </a:schemeClr>
+              </a:solidFill>
+            </a:endParaRPr>
+          </a:p>
+          <a:p>
+            <a:endParaRPr lang="en-IN" dirty="0">
+              <a:solidFill>
+                <a:schemeClr val="bg1">
+                  <a:lumMod val="85000"/>
+                </a:schemeClr>
+              </a:solidFill>
+            </a:endParaRPr>
+          </a:p>
+          <a:p>
+            <a:r>
+              <a:rPr lang="en-IN" dirty="0">
+                <a:solidFill>
+                  <a:schemeClr val="bg1">
+                    <a:lumMod val="85000"/>
+                  </a:schemeClr>
+                </a:solidFill>
+              </a:rPr>
+              <a:t>flex-direction</a:t>
+            </a:r>
+          </a:p>
+          <a:p>
+            <a:r>
+              <a:rPr lang="en-IN" dirty="0">
+                <a:solidFill>
+                  <a:schemeClr val="bg1">
+                    <a:lumMod val="85000"/>
+                  </a:schemeClr>
+                </a:solidFill>
+              </a:rPr>
+              <a:t>justify-content</a:t>
+            </a:r>
+          </a:p>
+          <a:p>
+            <a:r>
+              <a:rPr lang="en-IN" dirty="0">
+                <a:solidFill>
+                  <a:schemeClr val="bg1">
+                    <a:lumMod val="85000"/>
+                  </a:schemeClr>
+                </a:solidFill>
+              </a:rPr>
+              <a:t>align-items</a:t>
+            </a:r>
+          </a:p>
+          <a:p>
+            <a:r>
+              <a:rPr lang="en-IN" dirty="0">
+                <a:solidFill>
+                  <a:schemeClr val="bg1">
+                    <a:lumMod val="85000"/>
+                  </a:schemeClr>
+                </a:solidFill>
+              </a:rPr>
+              <a:t>flex-wrap</a:t>
+            </a:r>
+          </a:p>
+          <a:p>
+            <a:r>
+              <a:rPr lang="en-IN" dirty="0">
+                <a:solidFill>
+                  <a:schemeClr val="bg1">
+                    <a:lumMod val="85000"/>
+                  </a:schemeClr>
+                </a:solidFill>
+              </a:rPr>
+              <a:t>align-content</a:t>
+            </a:r>
+          </a:p>
+          <a:p>
+            <a:r>
+              <a:rPr lang="en-IN" dirty="0">
+                <a:solidFill>
+                  <a:schemeClr val="bg1">
+                    <a:lumMod val="85000"/>
+                  </a:schemeClr>
+                </a:solidFill>
+              </a:rPr>
+              <a:t>gap</a:t>
+            </a:r>
+          </a:p>
+        </p:txBody>
+      </p:sp>
+      <p:pic>
+        <p:nvPicPr>
+          <p:cNvPr id="1028" name="Picture 4">
+            <a:extLst>
+              <a:ext uri="{FF2B5EF4-FFF2-40B4-BE49-F238E27FC236}">
+                <a16:creationId xmlns:a16="http://schemas.microsoft.com/office/drawing/2014/main" id="{B60E9E92-1C47-98E6-EB47-F7B588AFE230}"/>
+              </a:ext>
+            </a:extLst>
+          </p:cNvPr>
+          <p:cNvPicPr>
+            <a:picLocks noChangeAspect="1" noChangeArrowheads="1"/>
+          </p:cNvPicPr>
+          <p:nvPr/>
+        </p:nvPicPr>
+        <p:blipFill>
+          <a:blip r:embed="rId3">
+            <a:extLst>
+              <a:ext uri="{28A0092B-C50C-407E-A947-70E740481C1C}">
+                <a14:useLocalDpi xmlns:a14="http://schemas.microsoft.com/office/drawing/2010/main" val="0"/>
+              </a:ext>
+            </a:extLst>
+          </a:blip>
+          <a:srcRect/>
+          <a:stretch>
+            <a:fillRect/>
+          </a:stretch>
+        </p:blipFill>
+        <p:spPr bwMode="auto">
+          <a:xfrm>
+            <a:off x="7322198" y="1988198"/>
+            <a:ext cx="4869802" cy="4869802"/>
+          </a:xfrm>
+          <a:prstGeom prst="rect">
+            <a:avLst/>
+          </a:prstGeom>
+          <a:noFill/>
+          <a:extLst>
+            <a:ext uri="{909E8E84-426E-40DD-AFC4-6F175D3DCCD1}">
+              <a14:hiddenFill xmlns:a14="http://schemas.microsoft.com/office/drawing/2010/main">
+                <a:solidFill>
+                  <a:srgbClr val="FFFFFF"/>
+                </a:solidFill>
+              </a14:hiddenFill>
+            </a:ext>
+          </a:extLst>
+        </p:spPr>
+      </p:pic>
+    </p:spTree>
+  </p:cSld>
+  <p:clrMapOvr>
+    <a:masterClrMapping/>
+  </p:clrMapOvr>
+</p:sld>
+</file>
+
+<file path=ppt/slides/slide7.xml><?xml version="1.0" encoding="utf-8"?>
+<p:sld xmlns:a="http://schemas.openxmlformats.org/drawingml/2006/main" xmlns:r="http://schemas.openxmlformats.org/officeDocument/2006/relationships" xmlns:p="http://schemas.openxmlformats.org/presentationml/2006/main" showMasterPhAnim="0">
+  <p:cSld>
+    <p:bg>
+      <p:bgPr>
+        <a:solidFill>
+          <a:srgbClr val="3D3028"/>
+        </a:solidFill>
+        <a:effectLst/>
+      </p:bgPr>
+    </p:bg>
+    <p:spTree>
+      <p:nvGrpSpPr>
+        <p:cNvPr id="1" name=""/>
+        <p:cNvGrpSpPr/>
+        <p:nvPr/>
+      </p:nvGrpSpPr>
+      <p:grpSpPr bwMode="auto">
+        <a:xfrm>
+          <a:off x="0" y="0"/>
+          <a:ext cx="0" cy="0"/>
+          <a:chOff x="0" y="0"/>
+          <a:chExt cx="0" cy="0"/>
+        </a:xfrm>
+      </p:grpSpPr>
+      <p:sp>
+        <p:nvSpPr>
+          <p:cNvPr id="1025653482" name="Title 1"/>
+          <p:cNvSpPr>
+            <a:spLocks noGrp="1"/>
+          </p:cNvSpPr>
+          <p:nvPr>
+            <p:ph type="title"/>
+          </p:nvPr>
+        </p:nvSpPr>
+        <p:spPr bwMode="auto"/>
+        <p:txBody>
+          <a:bodyPr/>
+          <a:lstStyle/>
+          <a:p>
+            <a:pPr algn="l">
+              <a:lnSpc>
+                <a:spcPct val="100000"/>
+              </a:lnSpc>
+              <a:defRPr/>
+            </a:pPr>
+            <a:r>
               <a:rPr lang="en-US" sz="4400" b="0" i="0" u="sng" strike="noStrike" cap="none" spc="0">
                 <a:solidFill>
                   <a:schemeClr val="accent4">
@@ -5402,24 +5658,242 @@
           </a:p>
         </p:txBody>
       </p:sp>
+      <p:sp>
+        <p:nvSpPr>
+          <p:cNvPr id="2" name="Content Placeholder 1">
+            <a:extLst>
+              <a:ext uri="{FF2B5EF4-FFF2-40B4-BE49-F238E27FC236}">
+                <a16:creationId xmlns:a16="http://schemas.microsoft.com/office/drawing/2014/main" id="{E3923CF9-FF32-5BD7-A357-AA86E3CF87B7}"/>
+              </a:ext>
+            </a:extLst>
+          </p:cNvPr>
+          <p:cNvSpPr>
+            <a:spLocks noGrp="1"/>
+          </p:cNvSpPr>
+          <p:nvPr>
+            <p:ph idx="1"/>
+          </p:nvPr>
+        </p:nvSpPr>
+        <p:spPr/>
+        <p:txBody>
+          <a:bodyPr/>
+          <a:lstStyle/>
+          <a:p>
+            <a:r>
+              <a:rPr lang="en-IN" dirty="0">
+                <a:solidFill>
+                  <a:schemeClr val="bg1">
+                    <a:lumMod val="85000"/>
+                  </a:schemeClr>
+                </a:solidFill>
+              </a:rPr>
+              <a:t>order</a:t>
+            </a:r>
+          </a:p>
+          <a:p>
+            <a:r>
+              <a:rPr lang="en-IN" dirty="0">
+                <a:solidFill>
+                  <a:schemeClr val="bg1">
+                    <a:lumMod val="85000"/>
+                  </a:schemeClr>
+                </a:solidFill>
+              </a:rPr>
+              <a:t>flex-grow</a:t>
+            </a:r>
+          </a:p>
+          <a:p>
+            <a:r>
+              <a:rPr lang="en-IN" dirty="0">
+                <a:solidFill>
+                  <a:schemeClr val="bg1">
+                    <a:lumMod val="85000"/>
+                  </a:schemeClr>
+                </a:solidFill>
+              </a:rPr>
+              <a:t>flex-shrink</a:t>
+            </a:r>
+          </a:p>
+          <a:p>
+            <a:r>
+              <a:rPr lang="en-IN" dirty="0">
+                <a:solidFill>
+                  <a:schemeClr val="bg1">
+                    <a:lumMod val="85000"/>
+                  </a:schemeClr>
+                </a:solidFill>
+              </a:rPr>
+              <a:t>flex-basis</a:t>
+            </a:r>
+          </a:p>
+          <a:p>
+            <a:r>
+              <a:rPr lang="en-IN" dirty="0">
+                <a:solidFill>
+                  <a:schemeClr val="bg1">
+                    <a:lumMod val="85000"/>
+                  </a:schemeClr>
+                </a:solidFill>
+              </a:rPr>
+              <a:t>flex (shorthand)</a:t>
+            </a:r>
+          </a:p>
+          <a:p>
+            <a:endParaRPr lang="en-IN" dirty="0">
+              <a:solidFill>
+                <a:schemeClr val="bg1">
+                  <a:lumMod val="85000"/>
+                </a:schemeClr>
+              </a:solidFill>
+            </a:endParaRPr>
+          </a:p>
+        </p:txBody>
+      </p:sp>
     </p:spTree>
+    <p:extLst>
+      <p:ext uri="{BB962C8B-B14F-4D97-AF65-F5344CB8AC3E}">
+        <p14:creationId xmlns:p14="http://schemas.microsoft.com/office/powerpoint/2010/main" val="507955113"/>
+      </p:ext>
+    </p:extLst>
   </p:cSld>
   <p:clrMapOvr>
     <a:masterClrMapping/>
   </p:clrMapOvr>
-  <mc:AlternateContent xmlns:mc="http://schemas.openxmlformats.org/markup-compatibility/2006">
-    <mc:Choice xmlns:p159="http://schemas.microsoft.com/office/powerpoint/2015/09/main" xmlns:p14="http://schemas.microsoft.com/office/powerpoint/2010/main" Requires="p159">
-      <p:transition p14:dur="2000" advClick="1"/>
-    </mc:Choice>
-    <mc:Fallback>
-      <p:transition advClick="1"/>
-    </mc:Fallback>
-  </mc:AlternateContent>
+</p:sld>
+</file>
+
+<file path=ppt/slides/slide8.xml><?xml version="1.0" encoding="utf-8"?>
+<p:sld xmlns:a="http://schemas.openxmlformats.org/drawingml/2006/main" xmlns:r="http://schemas.openxmlformats.org/officeDocument/2006/relationships" xmlns:p="http://schemas.openxmlformats.org/presentationml/2006/main" showMasterPhAnim="0">
+  <p:cSld>
+    <p:bg>
+      <p:bgPr>
+        <a:solidFill>
+          <a:srgbClr val="3D3028"/>
+        </a:solidFill>
+        <a:effectLst/>
+      </p:bgPr>
+    </p:bg>
+    <p:spTree>
+      <p:nvGrpSpPr>
+        <p:cNvPr id="1" name=""/>
+        <p:cNvGrpSpPr/>
+        <p:nvPr/>
+      </p:nvGrpSpPr>
+      <p:grpSpPr bwMode="auto">
+        <a:xfrm>
+          <a:off x="0" y="0"/>
+          <a:ext cx="0" cy="0"/>
+          <a:chOff x="0" y="0"/>
+          <a:chExt cx="0" cy="0"/>
+        </a:xfrm>
+      </p:grpSpPr>
+      <p:sp>
+        <p:nvSpPr>
+          <p:cNvPr id="1025653482" name="Title 1"/>
+          <p:cNvSpPr>
+            <a:spLocks noGrp="1"/>
+          </p:cNvSpPr>
+          <p:nvPr>
+            <p:ph type="title"/>
+          </p:nvPr>
+        </p:nvSpPr>
+        <p:spPr bwMode="auto"/>
+        <p:txBody>
+          <a:bodyPr/>
+          <a:lstStyle/>
+          <a:p>
+            <a:pPr algn="l">
+              <a:lnSpc>
+                <a:spcPct val="100000"/>
+              </a:lnSpc>
+              <a:defRPr/>
+            </a:pPr>
+            <a:r>
+              <a:rPr lang="en-US" sz="4400" b="0" i="0" u="sng" strike="noStrike" cap="none" spc="0" dirty="0">
+                <a:solidFill>
+                  <a:schemeClr val="accent4">
+                    <a:lumMod val="40000"/>
+                    <a:lumOff val="60000"/>
+                  </a:schemeClr>
+                </a:solidFill>
+                <a:latin typeface="Open Sans"/>
+                <a:ea typeface="Open Sans"/>
+                <a:cs typeface="Open Sans"/>
+              </a:rPr>
+              <a:t>Navbar</a:t>
+            </a:r>
+            <a:endParaRPr sz="4400" u="sng" dirty="0">
+              <a:solidFill>
+                <a:schemeClr val="bg1">
+                  <a:lumMod val="95000"/>
+                </a:schemeClr>
+              </a:solidFill>
+              <a:latin typeface="Open Sans"/>
+              <a:cs typeface="Open Sans"/>
+            </a:endParaRPr>
+          </a:p>
+          <a:p>
+            <a:pPr>
+              <a:defRPr/>
+            </a:pPr>
+            <a:endParaRPr dirty="0"/>
+          </a:p>
+        </p:txBody>
+      </p:sp>
+      <p:sp>
+        <p:nvSpPr>
+          <p:cNvPr id="2" name="Content Placeholder 1">
+            <a:extLst>
+              <a:ext uri="{FF2B5EF4-FFF2-40B4-BE49-F238E27FC236}">
+                <a16:creationId xmlns:a16="http://schemas.microsoft.com/office/drawing/2014/main" id="{E3923CF9-FF32-5BD7-A357-AA86E3CF87B7}"/>
+              </a:ext>
+            </a:extLst>
+          </p:cNvPr>
+          <p:cNvSpPr>
+            <a:spLocks noGrp="1"/>
+          </p:cNvSpPr>
+          <p:nvPr>
+            <p:ph idx="4294967295"/>
+          </p:nvPr>
+        </p:nvSpPr>
+        <p:spPr>
+          <a:xfrm>
+            <a:off x="0" y="2771191"/>
+            <a:ext cx="4898571" cy="3405771"/>
+          </a:xfrm>
+        </p:spPr>
+        <p:txBody>
+          <a:bodyPr/>
+          <a:lstStyle/>
+          <a:p>
+            <a:pPr marL="0" indent="0">
+              <a:buNone/>
+            </a:pPr>
+            <a:endParaRPr lang="en-IN" dirty="0">
+              <a:solidFill>
+                <a:schemeClr val="bg1">
+                  <a:lumMod val="85000"/>
+                </a:schemeClr>
+              </a:solidFill>
+            </a:endParaRPr>
+          </a:p>
+        </p:txBody>
+      </p:sp>
+    </p:spTree>
+    <p:extLst>
+      <p:ext uri="{BB962C8B-B14F-4D97-AF65-F5344CB8AC3E}">
+        <p14:creationId xmlns:p14="http://schemas.microsoft.com/office/powerpoint/2010/main" val="1990954085"/>
+      </p:ext>
+    </p:extLst>
+  </p:cSld>
+  <p:clrMapOvr>
+    <a:masterClrMapping/>
+  </p:clrMapOvr>
 </p:sld>
 </file>
 
 <file path=ppt/theme/theme1.xml><?xml version="1.0" encoding="utf-8"?>
-<a:theme xmlns:a="http://schemas.openxmlformats.org/drawingml/2006/main" xmlns:r="http://schemas.openxmlformats.org/officeDocument/2006/relationships" xmlns:p="http://schemas.openxmlformats.org/presentationml/2006/main" name="Office Theme">
+<a:theme xmlns:a="http://schemas.openxmlformats.org/drawingml/2006/main" name="Office Theme">
   <a:themeElements>
     <a:clrScheme name="New Office">
       <a:dk1>
@@ -5622,11 +6096,12 @@
     </a:fmtScheme>
   </a:themeElements>
   <a:objectDefaults/>
+  <a:extraClrSchemeLst/>
 </a:theme>
 </file>
 
 <file path=ppt/theme/theme2.xml><?xml version="1.0" encoding="utf-8"?>
-<a:theme xmlns:a="http://schemas.openxmlformats.org/drawingml/2006/main" xmlns:r="http://schemas.openxmlformats.org/officeDocument/2006/relationships" xmlns:p="http://schemas.openxmlformats.org/presentationml/2006/main" name="Office Theme">
+<a:theme xmlns:a="http://schemas.openxmlformats.org/drawingml/2006/main" name="Office Theme">
   <a:themeElements>
     <a:clrScheme name="Office">
       <a:dk1>
@@ -5829,5 +6304,6 @@
     </a:fmtScheme>
   </a:themeElements>
   <a:objectDefaults/>
+  <a:extraClrSchemeLst/>
 </a:theme>
 </file>
</xml_diff>